<commit_message>
Content for Week 5
</commit_message>
<xml_diff>
--- a/2022-SPR/Week04.pptx
+++ b/2022-SPR/Week04.pptx
@@ -275,7 +275,7 @@
           <a:p>
             <a:fld id="{2B1919C7-6BC3-4736-AC32-A62C7B81C82C}" type="datetimeFigureOut">
               <a:rPr lang="en-US" smtClean="0"/>
-              <a:t>1/29/2022</a:t>
+              <a:t>2/2/2022</a:t>
             </a:fld>
             <a:endParaRPr lang="en-US"/>
           </a:p>
@@ -473,7 +473,7 @@
           <a:p>
             <a:fld id="{2B1919C7-6BC3-4736-AC32-A62C7B81C82C}" type="datetimeFigureOut">
               <a:rPr lang="en-US" smtClean="0"/>
-              <a:t>1/29/2022</a:t>
+              <a:t>2/2/2022</a:t>
             </a:fld>
             <a:endParaRPr lang="en-US"/>
           </a:p>
@@ -681,7 +681,7 @@
           <a:p>
             <a:fld id="{2B1919C7-6BC3-4736-AC32-A62C7B81C82C}" type="datetimeFigureOut">
               <a:rPr lang="en-US" smtClean="0"/>
-              <a:t>1/29/2022</a:t>
+              <a:t>2/2/2022</a:t>
             </a:fld>
             <a:endParaRPr lang="en-US"/>
           </a:p>
@@ -879,7 +879,7 @@
           <a:p>
             <a:fld id="{2B1919C7-6BC3-4736-AC32-A62C7B81C82C}" type="datetimeFigureOut">
               <a:rPr lang="en-US" smtClean="0"/>
-              <a:t>1/29/2022</a:t>
+              <a:t>2/2/2022</a:t>
             </a:fld>
             <a:endParaRPr lang="en-US"/>
           </a:p>
@@ -1154,7 +1154,7 @@
           <a:p>
             <a:fld id="{2B1919C7-6BC3-4736-AC32-A62C7B81C82C}" type="datetimeFigureOut">
               <a:rPr lang="en-US" smtClean="0"/>
-              <a:t>1/29/2022</a:t>
+              <a:t>2/2/2022</a:t>
             </a:fld>
             <a:endParaRPr lang="en-US"/>
           </a:p>
@@ -1419,7 +1419,7 @@
           <a:p>
             <a:fld id="{2B1919C7-6BC3-4736-AC32-A62C7B81C82C}" type="datetimeFigureOut">
               <a:rPr lang="en-US" smtClean="0"/>
-              <a:t>1/29/2022</a:t>
+              <a:t>2/2/2022</a:t>
             </a:fld>
             <a:endParaRPr lang="en-US"/>
           </a:p>
@@ -1831,7 +1831,7 @@
           <a:p>
             <a:fld id="{2B1919C7-6BC3-4736-AC32-A62C7B81C82C}" type="datetimeFigureOut">
               <a:rPr lang="en-US" smtClean="0"/>
-              <a:t>1/29/2022</a:t>
+              <a:t>2/2/2022</a:t>
             </a:fld>
             <a:endParaRPr lang="en-US"/>
           </a:p>
@@ -1972,7 +1972,7 @@
           <a:p>
             <a:fld id="{2B1919C7-6BC3-4736-AC32-A62C7B81C82C}" type="datetimeFigureOut">
               <a:rPr lang="en-US" smtClean="0"/>
-              <a:t>1/29/2022</a:t>
+              <a:t>2/2/2022</a:t>
             </a:fld>
             <a:endParaRPr lang="en-US"/>
           </a:p>
@@ -2085,7 +2085,7 @@
           <a:p>
             <a:fld id="{2B1919C7-6BC3-4736-AC32-A62C7B81C82C}" type="datetimeFigureOut">
               <a:rPr lang="en-US" smtClean="0"/>
-              <a:t>1/29/2022</a:t>
+              <a:t>2/2/2022</a:t>
             </a:fld>
             <a:endParaRPr lang="en-US"/>
           </a:p>
@@ -2396,7 +2396,7 @@
           <a:p>
             <a:fld id="{2B1919C7-6BC3-4736-AC32-A62C7B81C82C}" type="datetimeFigureOut">
               <a:rPr lang="en-US" smtClean="0"/>
-              <a:t>1/29/2022</a:t>
+              <a:t>2/2/2022</a:t>
             </a:fld>
             <a:endParaRPr lang="en-US"/>
           </a:p>
@@ -2684,7 +2684,7 @@
           <a:p>
             <a:fld id="{2B1919C7-6BC3-4736-AC32-A62C7B81C82C}" type="datetimeFigureOut">
               <a:rPr lang="en-US" smtClean="0"/>
-              <a:t>1/29/2022</a:t>
+              <a:t>2/2/2022</a:t>
             </a:fld>
             <a:endParaRPr lang="en-US"/>
           </a:p>
@@ -2925,7 +2925,7 @@
           <a:p>
             <a:fld id="{2B1919C7-6BC3-4736-AC32-A62C7B81C82C}" type="datetimeFigureOut">
               <a:rPr lang="en-US" smtClean="0"/>
-              <a:t>1/29/2022</a:t>
+              <a:t>2/2/2022</a:t>
             </a:fld>
             <a:endParaRPr lang="en-US"/>
           </a:p>
@@ -5370,7 +5370,7 @@
         </p:blipFill>
         <p:spPr>
           <a:xfrm>
-            <a:off x="3455582" y="3429000"/>
+            <a:off x="3395947" y="4001294"/>
             <a:ext cx="304800" cy="285750"/>
           </a:xfrm>
           <a:prstGeom prst="rect">

</xml_diff>